<commit_message>
Updated unmarked random effect slide
</commit_message>
<xml_diff>
--- a/lessons/Nmix advanced.pptx
+++ b/lessons/Nmix advanced.pptx
@@ -125,17 +125,70 @@
 </p:presentation>
 </file>
 
+<file path=ppt/revisionInfo.xml><?xml version="1.0" encoding="utf-8"?>
+<p1510:revInfo xmlns:a="http://schemas.openxmlformats.org/drawingml/2006/main" xmlns:r="http://schemas.openxmlformats.org/officeDocument/2006/relationships" xmlns:p1510="http://schemas.microsoft.com/office/powerpoint/2015/10/main">
+  <p1510:revLst>
+    <p1510:client id="{BDBDAE57-41EC-4530-BB75-8B06A55269BE}" v="3" dt="2021-07-28T14:23:38.797"/>
+  </p1510:revLst>
+</p1510:revInfo>
+</file>
+
 <file path=ppt/changesInfos/changesInfo1.xml><?xml version="1.0" encoding="utf-8"?>
 <pc:chgInfo xmlns:a="http://schemas.openxmlformats.org/drawingml/2006/main" xmlns:r="http://schemas.openxmlformats.org/officeDocument/2006/relationships" xmlns:ac="http://schemas.microsoft.com/office/drawing/2013/main/command" xmlns:pc="http://schemas.microsoft.com/office/powerpoint/2013/main/command">
   <pc:docChgLst>
     <pc:chgData name="Ross, Beth E" userId="898e0e64-6ff7-43b7-83b6-5831167983a7" providerId="ADAL" clId="{BDBDAE57-41EC-4530-BB75-8B06A55269BE}"/>
     <pc:docChg chg="undo custSel addSld modSld">
-      <pc:chgData name="Ross, Beth E" userId="898e0e64-6ff7-43b7-83b6-5831167983a7" providerId="ADAL" clId="{BDBDAE57-41EC-4530-BB75-8B06A55269BE}" dt="2021-07-13T21:20:37.807" v="424" actId="20577"/>
+      <pc:chgData name="Ross, Beth E" userId="898e0e64-6ff7-43b7-83b6-5831167983a7" providerId="ADAL" clId="{BDBDAE57-41EC-4530-BB75-8B06A55269BE}" dt="2021-07-28T14:41:10.169" v="442" actId="20577"/>
       <pc:docMkLst>
         <pc:docMk/>
       </pc:docMkLst>
+      <pc:sldChg chg="addSp modSp">
+        <pc:chgData name="Ross, Beth E" userId="898e0e64-6ff7-43b7-83b6-5831167983a7" providerId="ADAL" clId="{BDBDAE57-41EC-4530-BB75-8B06A55269BE}" dt="2021-07-28T14:23:27.277" v="425"/>
+        <pc:sldMkLst>
+          <pc:docMk/>
+          <pc:sldMk cId="946158040" sldId="287"/>
+        </pc:sldMkLst>
+        <pc:picChg chg="add mod">
+          <ac:chgData name="Ross, Beth E" userId="898e0e64-6ff7-43b7-83b6-5831167983a7" providerId="ADAL" clId="{BDBDAE57-41EC-4530-BB75-8B06A55269BE}" dt="2021-07-28T14:23:27.277" v="425"/>
+          <ac:picMkLst>
+            <pc:docMk/>
+            <pc:sldMk cId="946158040" sldId="287"/>
+            <ac:picMk id="5" creationId="{CE214C98-9BFA-425B-906D-39C25F7D46FF}"/>
+          </ac:picMkLst>
+        </pc:picChg>
+      </pc:sldChg>
+      <pc:sldChg chg="addSp modSp">
+        <pc:chgData name="Ross, Beth E" userId="898e0e64-6ff7-43b7-83b6-5831167983a7" providerId="ADAL" clId="{BDBDAE57-41EC-4530-BB75-8B06A55269BE}" dt="2021-07-28T14:23:37.357" v="426"/>
+        <pc:sldMkLst>
+          <pc:docMk/>
+          <pc:sldMk cId="1243999704" sldId="288"/>
+        </pc:sldMkLst>
+        <pc:picChg chg="add mod">
+          <ac:chgData name="Ross, Beth E" userId="898e0e64-6ff7-43b7-83b6-5831167983a7" providerId="ADAL" clId="{BDBDAE57-41EC-4530-BB75-8B06A55269BE}" dt="2021-07-28T14:23:37.357" v="426"/>
+          <ac:picMkLst>
+            <pc:docMk/>
+            <pc:sldMk cId="1243999704" sldId="288"/>
+            <ac:picMk id="4" creationId="{E1E5B409-1A9A-47D7-983C-816E0E689A5D}"/>
+          </ac:picMkLst>
+        </pc:picChg>
+      </pc:sldChg>
+      <pc:sldChg chg="addSp modSp">
+        <pc:chgData name="Ross, Beth E" userId="898e0e64-6ff7-43b7-83b6-5831167983a7" providerId="ADAL" clId="{BDBDAE57-41EC-4530-BB75-8B06A55269BE}" dt="2021-07-28T14:23:38.797" v="427"/>
+        <pc:sldMkLst>
+          <pc:docMk/>
+          <pc:sldMk cId="1603084269" sldId="291"/>
+        </pc:sldMkLst>
+        <pc:picChg chg="add mod">
+          <ac:chgData name="Ross, Beth E" userId="898e0e64-6ff7-43b7-83b6-5831167983a7" providerId="ADAL" clId="{BDBDAE57-41EC-4530-BB75-8B06A55269BE}" dt="2021-07-28T14:23:38.797" v="427"/>
+          <ac:picMkLst>
+            <pc:docMk/>
+            <pc:sldMk cId="1603084269" sldId="291"/>
+            <ac:picMk id="7" creationId="{B9951DC6-B75F-441C-B4EF-6CEFE6D8381A}"/>
+          </ac:picMkLst>
+        </pc:picChg>
+      </pc:sldChg>
       <pc:sldChg chg="modSp new mod">
-        <pc:chgData name="Ross, Beth E" userId="898e0e64-6ff7-43b7-83b6-5831167983a7" providerId="ADAL" clId="{BDBDAE57-41EC-4530-BB75-8B06A55269BE}" dt="2021-07-13T21:19:28.919" v="211" actId="313"/>
+        <pc:chgData name="Ross, Beth E" userId="898e0e64-6ff7-43b7-83b6-5831167983a7" providerId="ADAL" clId="{BDBDAE57-41EC-4530-BB75-8B06A55269BE}" dt="2021-07-28T14:40:50.025" v="438" actId="20577"/>
         <pc:sldMkLst>
           <pc:docMk/>
           <pc:sldMk cId="768075529" sldId="296"/>
@@ -149,7 +202,7 @@
           </ac:spMkLst>
         </pc:spChg>
         <pc:spChg chg="mod">
-          <ac:chgData name="Ross, Beth E" userId="898e0e64-6ff7-43b7-83b6-5831167983a7" providerId="ADAL" clId="{BDBDAE57-41EC-4530-BB75-8B06A55269BE}" dt="2021-07-13T21:19:28.919" v="211" actId="313"/>
+          <ac:chgData name="Ross, Beth E" userId="898e0e64-6ff7-43b7-83b6-5831167983a7" providerId="ADAL" clId="{BDBDAE57-41EC-4530-BB75-8B06A55269BE}" dt="2021-07-28T14:40:50.025" v="438" actId="20577"/>
           <ac:spMkLst>
             <pc:docMk/>
             <pc:sldMk cId="768075529" sldId="296"/>
@@ -158,13 +211,13 @@
         </pc:spChg>
       </pc:sldChg>
       <pc:sldChg chg="modSp new mod">
-        <pc:chgData name="Ross, Beth E" userId="898e0e64-6ff7-43b7-83b6-5831167983a7" providerId="ADAL" clId="{BDBDAE57-41EC-4530-BB75-8B06A55269BE}" dt="2021-07-13T21:20:37.807" v="424" actId="20577"/>
+        <pc:chgData name="Ross, Beth E" userId="898e0e64-6ff7-43b7-83b6-5831167983a7" providerId="ADAL" clId="{BDBDAE57-41EC-4530-BB75-8B06A55269BE}" dt="2021-07-28T14:41:10.169" v="442" actId="20577"/>
         <pc:sldMkLst>
           <pc:docMk/>
           <pc:sldMk cId="1933403794" sldId="297"/>
         </pc:sldMkLst>
         <pc:spChg chg="mod">
-          <ac:chgData name="Ross, Beth E" userId="898e0e64-6ff7-43b7-83b6-5831167983a7" providerId="ADAL" clId="{BDBDAE57-41EC-4530-BB75-8B06A55269BE}" dt="2021-07-13T21:19:40.223" v="226" actId="20577"/>
+          <ac:chgData name="Ross, Beth E" userId="898e0e64-6ff7-43b7-83b6-5831167983a7" providerId="ADAL" clId="{BDBDAE57-41EC-4530-BB75-8B06A55269BE}" dt="2021-07-28T14:41:07.945" v="440" actId="20577"/>
           <ac:spMkLst>
             <pc:docMk/>
             <pc:sldMk cId="1933403794" sldId="297"/>
@@ -172,7 +225,7 @@
           </ac:spMkLst>
         </pc:spChg>
         <pc:spChg chg="mod">
-          <ac:chgData name="Ross, Beth E" userId="898e0e64-6ff7-43b7-83b6-5831167983a7" providerId="ADAL" clId="{BDBDAE57-41EC-4530-BB75-8B06A55269BE}" dt="2021-07-13T21:20:37.807" v="424" actId="20577"/>
+          <ac:chgData name="Ross, Beth E" userId="898e0e64-6ff7-43b7-83b6-5831167983a7" providerId="ADAL" clId="{BDBDAE57-41EC-4530-BB75-8B06A55269BE}" dt="2021-07-28T14:41:10.169" v="442" actId="20577"/>
           <ac:spMkLst>
             <pc:docMk/>
             <pc:sldMk cId="1933403794" sldId="297"/>
@@ -332,7 +385,7 @@
           <a:p>
             <a:fld id="{C34CCC82-2199-4FC4-B872-BE2E4B471F6F}" type="datetimeFigureOut">
               <a:rPr lang="en-US" smtClean="0"/>
-              <a:t>7/13/2021</a:t>
+              <a:t>7/28/2021</a:t>
             </a:fld>
             <a:endParaRPr lang="en-US"/>
           </a:p>
@@ -530,7 +583,7 @@
           <a:p>
             <a:fld id="{C34CCC82-2199-4FC4-B872-BE2E4B471F6F}" type="datetimeFigureOut">
               <a:rPr lang="en-US" smtClean="0"/>
-              <a:t>7/13/2021</a:t>
+              <a:t>7/28/2021</a:t>
             </a:fld>
             <a:endParaRPr lang="en-US"/>
           </a:p>
@@ -738,7 +791,7 @@
           <a:p>
             <a:fld id="{C34CCC82-2199-4FC4-B872-BE2E4B471F6F}" type="datetimeFigureOut">
               <a:rPr lang="en-US" smtClean="0"/>
-              <a:t>7/13/2021</a:t>
+              <a:t>7/28/2021</a:t>
             </a:fld>
             <a:endParaRPr lang="en-US"/>
           </a:p>
@@ -936,7 +989,7 @@
           <a:p>
             <a:fld id="{C34CCC82-2199-4FC4-B872-BE2E4B471F6F}" type="datetimeFigureOut">
               <a:rPr lang="en-US" smtClean="0"/>
-              <a:t>7/13/2021</a:t>
+              <a:t>7/28/2021</a:t>
             </a:fld>
             <a:endParaRPr lang="en-US"/>
           </a:p>
@@ -1211,7 +1264,7 @@
           <a:p>
             <a:fld id="{C34CCC82-2199-4FC4-B872-BE2E4B471F6F}" type="datetimeFigureOut">
               <a:rPr lang="en-US" smtClean="0"/>
-              <a:t>7/13/2021</a:t>
+              <a:t>7/28/2021</a:t>
             </a:fld>
             <a:endParaRPr lang="en-US"/>
           </a:p>
@@ -1476,7 +1529,7 @@
           <a:p>
             <a:fld id="{C34CCC82-2199-4FC4-B872-BE2E4B471F6F}" type="datetimeFigureOut">
               <a:rPr lang="en-US" smtClean="0"/>
-              <a:t>7/13/2021</a:t>
+              <a:t>7/28/2021</a:t>
             </a:fld>
             <a:endParaRPr lang="en-US"/>
           </a:p>
@@ -1888,7 +1941,7 @@
           <a:p>
             <a:fld id="{C34CCC82-2199-4FC4-B872-BE2E4B471F6F}" type="datetimeFigureOut">
               <a:rPr lang="en-US" smtClean="0"/>
-              <a:t>7/13/2021</a:t>
+              <a:t>7/28/2021</a:t>
             </a:fld>
             <a:endParaRPr lang="en-US"/>
           </a:p>
@@ -2029,7 +2082,7 @@
           <a:p>
             <a:fld id="{C34CCC82-2199-4FC4-B872-BE2E4B471F6F}" type="datetimeFigureOut">
               <a:rPr lang="en-US" smtClean="0"/>
-              <a:t>7/13/2021</a:t>
+              <a:t>7/28/2021</a:t>
             </a:fld>
             <a:endParaRPr lang="en-US"/>
           </a:p>
@@ -2142,7 +2195,7 @@
           <a:p>
             <a:fld id="{C34CCC82-2199-4FC4-B872-BE2E4B471F6F}" type="datetimeFigureOut">
               <a:rPr lang="en-US" smtClean="0"/>
-              <a:t>7/13/2021</a:t>
+              <a:t>7/28/2021</a:t>
             </a:fld>
             <a:endParaRPr lang="en-US"/>
           </a:p>
@@ -2453,7 +2506,7 @@
           <a:p>
             <a:fld id="{C34CCC82-2199-4FC4-B872-BE2E4B471F6F}" type="datetimeFigureOut">
               <a:rPr lang="en-US" smtClean="0"/>
-              <a:t>7/13/2021</a:t>
+              <a:t>7/28/2021</a:t>
             </a:fld>
             <a:endParaRPr lang="en-US"/>
           </a:p>
@@ -2741,7 +2794,7 @@
           <a:p>
             <a:fld id="{C34CCC82-2199-4FC4-B872-BE2E4B471F6F}" type="datetimeFigureOut">
               <a:rPr lang="en-US" smtClean="0"/>
-              <a:t>7/13/2021</a:t>
+              <a:t>7/28/2021</a:t>
             </a:fld>
             <a:endParaRPr lang="en-US"/>
           </a:p>
@@ -2982,7 +3035,7 @@
           <a:p>
             <a:fld id="{C34CCC82-2199-4FC4-B872-BE2E4B471F6F}" type="datetimeFigureOut">
               <a:rPr lang="en-US" smtClean="0"/>
-              <a:t>7/13/2021</a:t>
+              <a:t>7/28/2021</a:t>
             </a:fld>
             <a:endParaRPr lang="en-US"/>
           </a:p>
@@ -4423,11 +4476,11 @@
           <a:p>
             <a:r>
               <a:rPr lang="en-US" sz="3200" dirty="0"/>
-              <a:t>Can’t be done in unmarked! Instead have to use package ‘</a:t>
+              <a:t>Can be done in ‘unmarked’ or package ‘</a:t>
             </a:r>
             <a:r>
               <a:rPr lang="en-US" sz="3200" dirty="0" err="1"/>
-              <a:t>umbs</a:t>
+              <a:t>ubms</a:t>
             </a:r>
             <a:r>
               <a:rPr lang="en-US" sz="3200" dirty="0"/>
@@ -4493,7 +4546,7 @@
             </a:r>
             <a:r>
               <a:rPr lang="en-US" dirty="0" err="1"/>
-              <a:t>umbs</a:t>
+              <a:t>ubms</a:t>
             </a:r>
             <a:endParaRPr lang="en-US" dirty="0"/>
           </a:p>
@@ -4524,7 +4577,7 @@
           <a:p>
             <a:r>
               <a:rPr lang="en-US" sz="3200" dirty="0" err="1"/>
-              <a:t>umbs</a:t>
+              <a:t>ubms</a:t>
             </a:r>
             <a:r>
               <a:rPr lang="en-US" sz="3200" dirty="0"/>
@@ -4553,10 +4606,9 @@
               <a:t>lmer</a:t>
             </a:r>
             <a:r>
-              <a:rPr lang="en-US" sz="3200"/>
+              <a:rPr lang="en-US" sz="3200" dirty="0"/>
               <a:t> code</a:t>
             </a:r>
-            <a:endParaRPr lang="en-US" sz="3200" dirty="0"/>
           </a:p>
         </p:txBody>
       </p:sp>
@@ -4832,6 +4884,53 @@
           <a:prstGeom prst="rect">
             <a:avLst/>
           </a:prstGeom>
+        </p:spPr>
+      </p:pic>
+      <p:pic>
+        <p:nvPicPr>
+          <p:cNvPr id="5" name="Picture 2" descr="Using Location-Based and Future Reminders">
+            <a:extLst>
+              <a:ext uri="{FF2B5EF4-FFF2-40B4-BE49-F238E27FC236}">
+                <a16:creationId xmlns:a16="http://schemas.microsoft.com/office/drawing/2014/main" id="{CE214C98-9BFA-425B-906D-39C25F7D46FF}"/>
+              </a:ext>
+            </a:extLst>
+          </p:cNvPr>
+          <p:cNvPicPr>
+            <a:picLocks noChangeAspect="1" noChangeArrowheads="1"/>
+          </p:cNvPicPr>
+          <p:nvPr/>
+        </p:nvPicPr>
+        <p:blipFill>
+          <a:blip r:embed="rId3">
+            <a:extLst>
+              <a:ext uri="{28A0092B-C50C-407E-A947-70E740481C1C}">
+                <a14:useLocalDpi xmlns:a14="http://schemas.microsoft.com/office/drawing/2010/main" val="0"/>
+              </a:ext>
+            </a:extLst>
+          </a:blip>
+          <a:srcRect/>
+          <a:stretch>
+            <a:fillRect/>
+          </a:stretch>
+        </p:blipFill>
+        <p:spPr bwMode="auto">
+          <a:xfrm>
+            <a:off x="8901404" y="0"/>
+            <a:ext cx="3290596" cy="1645298"/>
+          </a:xfrm>
+          <a:prstGeom prst="rect">
+            <a:avLst/>
+          </a:prstGeom>
+          <a:noFill/>
+          <a:extLst>
+            <a:ext uri="{909E8E84-426E-40DD-AFC4-6F175D3DCCD1}">
+              <a14:hiddenFill xmlns:a14="http://schemas.microsoft.com/office/drawing/2010/main">
+                <a:solidFill>
+                  <a:srgbClr val="FFFFFF"/>
+                </a:solidFill>
+              </a14:hiddenFill>
+            </a:ext>
+          </a:extLst>
         </p:spPr>
       </p:pic>
     </p:spTree>
@@ -4948,6 +5047,53 @@
           </a:p>
         </p:txBody>
       </p:sp>
+      <p:pic>
+        <p:nvPicPr>
+          <p:cNvPr id="4" name="Picture 2" descr="Using Location-Based and Future Reminders">
+            <a:extLst>
+              <a:ext uri="{FF2B5EF4-FFF2-40B4-BE49-F238E27FC236}">
+                <a16:creationId xmlns:a16="http://schemas.microsoft.com/office/drawing/2014/main" id="{E1E5B409-1A9A-47D7-983C-816E0E689A5D}"/>
+              </a:ext>
+            </a:extLst>
+          </p:cNvPr>
+          <p:cNvPicPr>
+            <a:picLocks noChangeAspect="1" noChangeArrowheads="1"/>
+          </p:cNvPicPr>
+          <p:nvPr/>
+        </p:nvPicPr>
+        <p:blipFill>
+          <a:blip r:embed="rId2">
+            <a:extLst>
+              <a:ext uri="{28A0092B-C50C-407E-A947-70E740481C1C}">
+                <a14:useLocalDpi xmlns:a14="http://schemas.microsoft.com/office/drawing/2010/main" val="0"/>
+              </a:ext>
+            </a:extLst>
+          </a:blip>
+          <a:srcRect/>
+          <a:stretch>
+            <a:fillRect/>
+          </a:stretch>
+        </p:blipFill>
+        <p:spPr bwMode="auto">
+          <a:xfrm>
+            <a:off x="8901404" y="0"/>
+            <a:ext cx="3290596" cy="1645298"/>
+          </a:xfrm>
+          <a:prstGeom prst="rect">
+            <a:avLst/>
+          </a:prstGeom>
+          <a:noFill/>
+          <a:extLst>
+            <a:ext uri="{909E8E84-426E-40DD-AFC4-6F175D3DCCD1}">
+              <a14:hiddenFill xmlns:a14="http://schemas.microsoft.com/office/drawing/2010/main">
+                <a:solidFill>
+                  <a:srgbClr val="FFFFFF"/>
+                </a:solidFill>
+              </a14:hiddenFill>
+            </a:ext>
+          </a:extLst>
+        </p:spPr>
+      </p:pic>
     </p:spTree>
     <p:extLst>
       <p:ext uri="{BB962C8B-B14F-4D97-AF65-F5344CB8AC3E}">
@@ -5064,6 +5210,53 @@
           <a:prstGeom prst="rect">
             <a:avLst/>
           </a:prstGeom>
+        </p:spPr>
+      </p:pic>
+      <p:pic>
+        <p:nvPicPr>
+          <p:cNvPr id="7" name="Picture 2" descr="Using Location-Based and Future Reminders">
+            <a:extLst>
+              <a:ext uri="{FF2B5EF4-FFF2-40B4-BE49-F238E27FC236}">
+                <a16:creationId xmlns:a16="http://schemas.microsoft.com/office/drawing/2014/main" id="{B9951DC6-B75F-441C-B4EF-6CEFE6D8381A}"/>
+              </a:ext>
+            </a:extLst>
+          </p:cNvPr>
+          <p:cNvPicPr>
+            <a:picLocks noChangeAspect="1" noChangeArrowheads="1"/>
+          </p:cNvPicPr>
+          <p:nvPr/>
+        </p:nvPicPr>
+        <p:blipFill>
+          <a:blip r:embed="rId4">
+            <a:extLst>
+              <a:ext uri="{28A0092B-C50C-407E-A947-70E740481C1C}">
+                <a14:useLocalDpi xmlns:a14="http://schemas.microsoft.com/office/drawing/2010/main" val="0"/>
+              </a:ext>
+            </a:extLst>
+          </a:blip>
+          <a:srcRect/>
+          <a:stretch>
+            <a:fillRect/>
+          </a:stretch>
+        </p:blipFill>
+        <p:spPr bwMode="auto">
+          <a:xfrm>
+            <a:off x="8901404" y="0"/>
+            <a:ext cx="3290596" cy="1645298"/>
+          </a:xfrm>
+          <a:prstGeom prst="rect">
+            <a:avLst/>
+          </a:prstGeom>
+          <a:noFill/>
+          <a:extLst>
+            <a:ext uri="{909E8E84-426E-40DD-AFC4-6F175D3DCCD1}">
+              <a14:hiddenFill xmlns:a14="http://schemas.microsoft.com/office/drawing/2010/main">
+                <a:solidFill>
+                  <a:srgbClr val="FFFFFF"/>
+                </a:solidFill>
+              </a14:hiddenFill>
+            </a:ext>
+          </a:extLst>
         </p:spPr>
       </p:pic>
     </p:spTree>

</xml_diff>